<commit_message>
Found the path generation problem
No find the source of the bug
</commit_message>
<xml_diff>
--- a/AnalysesAndValidation.pptx
+++ b/AnalysesAndValidation.pptx
@@ -9,6 +9,8 @@
     <p:sldId id="257" r:id="rId3"/>
     <p:sldId id="258" r:id="rId4"/>
     <p:sldId id="259" r:id="rId5"/>
+    <p:sldId id="260" r:id="rId6"/>
+    <p:sldId id="261" r:id="rId7"/>
   </p:sldIdLst>
   <p:sldSz cx="12192000" cy="6858000"/>
   <p:notesSz cx="6858000" cy="9144000"/>
@@ -107,6 +109,11 @@
       </a:defRPr>
     </a:lvl9pPr>
   </p:defaultTextStyle>
+  <p:extLst>
+    <p:ext uri="{EFAFB233-063F-42B5-8137-9DF3F51BA10A}">
+      <p15:sldGuideLst xmlns:p15="http://schemas.microsoft.com/office/powerpoint/2012/main"/>
+    </p:ext>
+  </p:extLst>
 </p:presentation>
 </file>
 
@@ -123,7 +130,7 @@
   <pc:docChgLst>
     <pc:chgData name="Steffen J.S. Bakker" userId="dd82627c-3b71-46ca-ba5b-5bc6f0c948cc" providerId="ADAL" clId="{38AC7A9E-DF77-41C8-ADA4-08D50E8CBE2E}"/>
     <pc:docChg chg="custSel addSld modSld">
-      <pc:chgData name="Steffen J.S. Bakker" userId="dd82627c-3b71-46ca-ba5b-5bc6f0c948cc" providerId="ADAL" clId="{38AC7A9E-DF77-41C8-ADA4-08D50E8CBE2E}" dt="2023-12-05T11:10:09.655" v="482" actId="1076"/>
+      <pc:chgData name="Steffen J.S. Bakker" userId="dd82627c-3b71-46ca-ba5b-5bc6f0c948cc" providerId="ADAL" clId="{38AC7A9E-DF77-41C8-ADA4-08D50E8CBE2E}" dt="2023-12-05T15:38:30.564" v="698" actId="20577"/>
       <pc:docMkLst>
         <pc:docMk/>
       </pc:docMkLst>
@@ -346,6 +353,36 @@
             <ac:picMk id="16" creationId="{FBB3A088-FC1B-CCB9-7E6B-BBBC7151DF6E}"/>
           </ac:picMkLst>
         </pc:picChg>
+      </pc:sldChg>
+      <pc:sldChg chg="modSp new mod">
+        <pc:chgData name="Steffen J.S. Bakker" userId="dd82627c-3b71-46ca-ba5b-5bc6f0c948cc" providerId="ADAL" clId="{38AC7A9E-DF77-41C8-ADA4-08D50E8CBE2E}" dt="2023-12-05T15:35:07.110" v="498" actId="20577"/>
+        <pc:sldMkLst>
+          <pc:docMk/>
+          <pc:sldMk cId="3608813148" sldId="260"/>
+        </pc:sldMkLst>
+        <pc:spChg chg="mod">
+          <ac:chgData name="Steffen J.S. Bakker" userId="dd82627c-3b71-46ca-ba5b-5bc6f0c948cc" providerId="ADAL" clId="{38AC7A9E-DF77-41C8-ADA4-08D50E8CBE2E}" dt="2023-12-05T15:35:07.110" v="498" actId="20577"/>
+          <ac:spMkLst>
+            <pc:docMk/>
+            <pc:sldMk cId="3608813148" sldId="260"/>
+            <ac:spMk id="2" creationId="{59EB35C5-B992-581D-3D0B-5ECC400C2068}"/>
+          </ac:spMkLst>
+        </pc:spChg>
+      </pc:sldChg>
+      <pc:sldChg chg="modSp new mod">
+        <pc:chgData name="Steffen J.S. Bakker" userId="dd82627c-3b71-46ca-ba5b-5bc6f0c948cc" providerId="ADAL" clId="{38AC7A9E-DF77-41C8-ADA4-08D50E8CBE2E}" dt="2023-12-05T15:38:30.564" v="698" actId="20577"/>
+        <pc:sldMkLst>
+          <pc:docMk/>
+          <pc:sldMk cId="2500323020" sldId="261"/>
+        </pc:sldMkLst>
+        <pc:spChg chg="mod">
+          <ac:chgData name="Steffen J.S. Bakker" userId="dd82627c-3b71-46ca-ba5b-5bc6f0c948cc" providerId="ADAL" clId="{38AC7A9E-DF77-41C8-ADA4-08D50E8CBE2E}" dt="2023-12-05T15:38:30.564" v="698" actId="20577"/>
+          <ac:spMkLst>
+            <pc:docMk/>
+            <pc:sldMk cId="2500323020" sldId="261"/>
+            <ac:spMk id="3" creationId="{524606B4-C63F-4AF7-6804-095F5264AB2D}"/>
+          </ac:spMkLst>
+        </pc:spChg>
       </pc:sldChg>
     </pc:docChg>
   </pc:docChgLst>
@@ -6520,6 +6557,323 @@
 </p:sld>
 </file>
 
+<file path=ppt/slides/slide5.xml><?xml version="1.0" encoding="utf-8"?>
+<p:sld xmlns:a="http://schemas.openxmlformats.org/drawingml/2006/main" xmlns:r="http://schemas.openxmlformats.org/officeDocument/2006/relationships" xmlns:p="http://schemas.openxmlformats.org/presentationml/2006/main">
+  <p:cSld>
+    <p:spTree>
+      <p:nvGrpSpPr>
+        <p:cNvPr id="1" name=""/>
+        <p:cNvGrpSpPr/>
+        <p:nvPr/>
+      </p:nvGrpSpPr>
+      <p:grpSpPr>
+        <a:xfrm>
+          <a:off x="0" y="0"/>
+          <a:ext cx="0" cy="0"/>
+          <a:chOff x="0" y="0"/>
+          <a:chExt cx="0" cy="0"/>
+        </a:xfrm>
+      </p:grpSpPr>
+      <p:sp>
+        <p:nvSpPr>
+          <p:cNvPr id="2" name="Title 1">
+            <a:extLst>
+              <a:ext uri="{FF2B5EF4-FFF2-40B4-BE49-F238E27FC236}">
+                <a16:creationId xmlns:a16="http://schemas.microsoft.com/office/drawing/2014/main" id="{59EB35C5-B992-581D-3D0B-5ECC400C2068}"/>
+              </a:ext>
+            </a:extLst>
+          </p:cNvPr>
+          <p:cNvSpPr>
+            <a:spLocks noGrp="1"/>
+          </p:cNvSpPr>
+          <p:nvPr>
+            <p:ph type="title"/>
+          </p:nvPr>
+        </p:nvSpPr>
+        <p:spPr/>
+        <p:txBody>
+          <a:bodyPr/>
+          <a:lstStyle/>
+          <a:p>
+            <a:r>
+              <a:rPr lang="nb-NO" dirty="0"/>
+              <a:t>PATH GENERATION</a:t>
+            </a:r>
+          </a:p>
+        </p:txBody>
+      </p:sp>
+      <p:sp>
+        <p:nvSpPr>
+          <p:cNvPr id="3" name="Content Placeholder 2">
+            <a:extLst>
+              <a:ext uri="{FF2B5EF4-FFF2-40B4-BE49-F238E27FC236}">
+                <a16:creationId xmlns:a16="http://schemas.microsoft.com/office/drawing/2014/main" id="{AA904170-3D74-4C06-1073-73981153039C}"/>
+              </a:ext>
+            </a:extLst>
+          </p:cNvPr>
+          <p:cNvSpPr>
+            <a:spLocks noGrp="1"/>
+          </p:cNvSpPr>
+          <p:nvPr>
+            <p:ph idx="1"/>
+          </p:nvPr>
+        </p:nvSpPr>
+        <p:spPr/>
+        <p:txBody>
+          <a:bodyPr/>
+          <a:lstStyle/>
+          <a:p>
+            <a:endParaRPr lang="nb-NO"/>
+          </a:p>
+        </p:txBody>
+      </p:sp>
+    </p:spTree>
+    <p:extLst>
+      <p:ext uri="{BB962C8B-B14F-4D97-AF65-F5344CB8AC3E}">
+        <p14:creationId xmlns:p14="http://schemas.microsoft.com/office/powerpoint/2010/main" val="3608813148"/>
+      </p:ext>
+    </p:extLst>
+  </p:cSld>
+  <p:clrMapOvr>
+    <a:masterClrMapping/>
+  </p:clrMapOvr>
+</p:sld>
+</file>
+
+<file path=ppt/slides/slide6.xml><?xml version="1.0" encoding="utf-8"?>
+<p:sld xmlns:a="http://schemas.openxmlformats.org/drawingml/2006/main" xmlns:r="http://schemas.openxmlformats.org/officeDocument/2006/relationships" xmlns:p="http://schemas.openxmlformats.org/presentationml/2006/main">
+  <p:cSld>
+    <p:spTree>
+      <p:nvGrpSpPr>
+        <p:cNvPr id="1" name=""/>
+        <p:cNvGrpSpPr/>
+        <p:nvPr/>
+      </p:nvGrpSpPr>
+      <p:grpSpPr>
+        <a:xfrm>
+          <a:off x="0" y="0"/>
+          <a:ext cx="0" cy="0"/>
+          <a:chOff x="0" y="0"/>
+          <a:chExt cx="0" cy="0"/>
+        </a:xfrm>
+      </p:grpSpPr>
+      <p:sp>
+        <p:nvSpPr>
+          <p:cNvPr id="2" name="Title 1">
+            <a:extLst>
+              <a:ext uri="{FF2B5EF4-FFF2-40B4-BE49-F238E27FC236}">
+                <a16:creationId xmlns:a16="http://schemas.microsoft.com/office/drawing/2014/main" id="{D20D8F5C-4AD2-C290-F1C3-679BB890A60E}"/>
+              </a:ext>
+            </a:extLst>
+          </p:cNvPr>
+          <p:cNvSpPr>
+            <a:spLocks noGrp="1"/>
+          </p:cNvSpPr>
+          <p:nvPr>
+            <p:ph type="title"/>
+          </p:nvPr>
+        </p:nvSpPr>
+        <p:spPr/>
+        <p:txBody>
+          <a:bodyPr/>
+          <a:lstStyle/>
+          <a:p>
+            <a:endParaRPr lang="nb-NO"/>
+          </a:p>
+        </p:txBody>
+      </p:sp>
+      <p:sp>
+        <p:nvSpPr>
+          <p:cNvPr id="3" name="Content Placeholder 2">
+            <a:extLst>
+              <a:ext uri="{FF2B5EF4-FFF2-40B4-BE49-F238E27FC236}">
+                <a16:creationId xmlns:a16="http://schemas.microsoft.com/office/drawing/2014/main" id="{524606B4-C63F-4AF7-6804-095F5264AB2D}"/>
+              </a:ext>
+            </a:extLst>
+          </p:cNvPr>
+          <p:cNvSpPr>
+            <a:spLocks noGrp="1"/>
+          </p:cNvSpPr>
+          <p:nvPr>
+            <p:ph idx="1"/>
+          </p:nvPr>
+        </p:nvSpPr>
+        <p:spPr/>
+        <p:txBody>
+          <a:bodyPr/>
+          <a:lstStyle/>
+          <a:p>
+            <a:r>
+              <a:rPr lang="nb-NO" dirty="0"/>
+              <a:t>This </a:t>
+            </a:r>
+            <a:r>
+              <a:rPr lang="nb-NO" dirty="0" err="1"/>
+              <a:t>path</a:t>
+            </a:r>
+            <a:r>
+              <a:rPr lang="nb-NO" dirty="0"/>
+              <a:t> is </a:t>
+            </a:r>
+            <a:r>
+              <a:rPr lang="nb-NO" dirty="0" err="1"/>
+              <a:t>generated</a:t>
+            </a:r>
+            <a:r>
+              <a:rPr lang="nb-NO" dirty="0"/>
+              <a:t>:</a:t>
+            </a:r>
+          </a:p>
+          <a:p>
+            <a:pPr lvl="1"/>
+            <a:r>
+              <a:rPr lang="nb-NO" dirty="0"/>
+              <a:t>Kristiansand,Skien,Rail,1,Skien,Oslo,Rail,1,Oslo,Hamar,Rail,1,Hamar,Oslo,Road,1,Oslo,Hamburg,Road,1</a:t>
+            </a:r>
+          </a:p>
+          <a:p>
+            <a:pPr lvl="1"/>
+            <a:r>
+              <a:rPr lang="nb-NO" dirty="0" err="1"/>
+              <a:t>While</a:t>
+            </a:r>
+            <a:r>
+              <a:rPr lang="nb-NO" dirty="0"/>
+              <a:t> it </a:t>
+            </a:r>
+            <a:r>
+              <a:rPr lang="nb-NO" dirty="0" err="1"/>
+              <a:t>should</a:t>
+            </a:r>
+            <a:r>
+              <a:rPr lang="nb-NO" dirty="0"/>
+              <a:t> never have </a:t>
+            </a:r>
+            <a:r>
+              <a:rPr lang="nb-NO" dirty="0" err="1"/>
+              <a:t>been</a:t>
+            </a:r>
+            <a:r>
+              <a:rPr lang="nb-NO" dirty="0"/>
+              <a:t> </a:t>
+            </a:r>
+            <a:r>
+              <a:rPr lang="nb-NO" dirty="0" err="1"/>
+              <a:t>generated</a:t>
+            </a:r>
+            <a:r>
+              <a:rPr lang="nb-NO" dirty="0"/>
+              <a:t>!</a:t>
+            </a:r>
+          </a:p>
+          <a:p>
+            <a:pPr lvl="1"/>
+            <a:endParaRPr lang="nb-NO" dirty="0"/>
+          </a:p>
+          <a:p>
+            <a:pPr lvl="1"/>
+            <a:endParaRPr lang="nb-NO" dirty="0"/>
+          </a:p>
+          <a:p>
+            <a:r>
+              <a:rPr lang="nb-NO" dirty="0"/>
+              <a:t>TO DO: run </a:t>
+            </a:r>
+            <a:r>
+              <a:rPr lang="nb-NO" dirty="0" err="1"/>
+              <a:t>the</a:t>
+            </a:r>
+            <a:r>
+              <a:rPr lang="nb-NO" dirty="0"/>
+              <a:t> unimodal </a:t>
+            </a:r>
+            <a:r>
+              <a:rPr lang="nb-NO" dirty="0" err="1"/>
+              <a:t>path</a:t>
+            </a:r>
+            <a:r>
+              <a:rPr lang="nb-NO" dirty="0"/>
+              <a:t> </a:t>
+            </a:r>
+            <a:r>
+              <a:rPr lang="nb-NO" dirty="0" err="1"/>
+              <a:t>generation</a:t>
+            </a:r>
+            <a:r>
+              <a:rPr lang="nb-NO" dirty="0"/>
+              <a:t> and </a:t>
+            </a:r>
+            <a:r>
+              <a:rPr lang="nb-NO" dirty="0" err="1"/>
+              <a:t>debug</a:t>
+            </a:r>
+            <a:r>
+              <a:rPr lang="nb-NO" dirty="0"/>
+              <a:t> </a:t>
+            </a:r>
+            <a:r>
+              <a:rPr lang="nb-NO" dirty="0" err="1"/>
+              <a:t>this</a:t>
+            </a:r>
+            <a:r>
+              <a:rPr lang="nb-NO" dirty="0"/>
+              <a:t> first!</a:t>
+            </a:r>
+          </a:p>
+          <a:p>
+            <a:pPr lvl="1"/>
+            <a:r>
+              <a:rPr lang="nb-NO" dirty="0" err="1"/>
+              <a:t>Then</a:t>
+            </a:r>
+            <a:r>
+              <a:rPr lang="nb-NO" dirty="0"/>
+              <a:t> </a:t>
+            </a:r>
+            <a:r>
+              <a:rPr lang="nb-NO" dirty="0" err="1"/>
+              <a:t>check</a:t>
+            </a:r>
+            <a:r>
+              <a:rPr lang="nb-NO" dirty="0"/>
+              <a:t> </a:t>
+            </a:r>
+            <a:r>
+              <a:rPr lang="nb-NO" dirty="0" err="1"/>
+              <a:t>two</a:t>
+            </a:r>
+            <a:r>
+              <a:rPr lang="nb-NO" dirty="0"/>
+              <a:t>-modal </a:t>
+            </a:r>
+            <a:r>
+              <a:rPr lang="nb-NO" dirty="0" err="1"/>
+              <a:t>path</a:t>
+            </a:r>
+            <a:r>
+              <a:rPr lang="nb-NO" dirty="0"/>
+              <a:t> </a:t>
+            </a:r>
+            <a:r>
+              <a:rPr lang="nb-NO"/>
+              <a:t>bugs</a:t>
+            </a:r>
+          </a:p>
+        </p:txBody>
+      </p:sp>
+    </p:spTree>
+    <p:extLst>
+      <p:ext uri="{BB962C8B-B14F-4D97-AF65-F5344CB8AC3E}">
+        <p14:creationId xmlns:p14="http://schemas.microsoft.com/office/powerpoint/2010/main" val="2500323020"/>
+      </p:ext>
+    </p:extLst>
+  </p:cSld>
+  <p:clrMapOvr>
+    <a:masterClrMapping/>
+  </p:clrMapOvr>
+</p:sld>
+</file>
+
 <file path=ppt/theme/theme1.xml><?xml version="1.0" encoding="utf-8"?>
 <a:theme xmlns:a="http://schemas.openxmlformats.org/drawingml/2006/main" name="Office Theme">
   <a:themeElements>

</xml_diff>

<commit_message>
Path generation bug 1
Caused by halving the transport distances for import/export. We should rather half the costs/emissions
</commit_message>
<xml_diff>
--- a/AnalysesAndValidation.pptx
+++ b/AnalysesAndValidation.pptx
@@ -11,6 +11,7 @@
     <p:sldId id="259" r:id="rId5"/>
     <p:sldId id="260" r:id="rId6"/>
     <p:sldId id="261" r:id="rId7"/>
+    <p:sldId id="262" r:id="rId8"/>
   </p:sldIdLst>
   <p:sldSz cx="12192000" cy="6858000"/>
   <p:notesSz cx="6858000" cy="9144000"/>
@@ -130,7 +131,7 @@
   <pc:docChgLst>
     <pc:chgData name="Steffen J.S. Bakker" userId="dd82627c-3b71-46ca-ba5b-5bc6f0c948cc" providerId="ADAL" clId="{38AC7A9E-DF77-41C8-ADA4-08D50E8CBE2E}"/>
     <pc:docChg chg="custSel addSld modSld">
-      <pc:chgData name="Steffen J.S. Bakker" userId="dd82627c-3b71-46ca-ba5b-5bc6f0c948cc" providerId="ADAL" clId="{38AC7A9E-DF77-41C8-ADA4-08D50E8CBE2E}" dt="2023-12-05T15:38:30.564" v="698" actId="20577"/>
+      <pc:chgData name="Steffen J.S. Bakker" userId="dd82627c-3b71-46ca-ba5b-5bc6f0c948cc" providerId="ADAL" clId="{38AC7A9E-DF77-41C8-ADA4-08D50E8CBE2E}" dt="2023-12-08T12:23:07.994" v="934" actId="113"/>
       <pc:docMkLst>
         <pc:docMk/>
       </pc:docMkLst>
@@ -384,6 +385,21 @@
           </ac:spMkLst>
         </pc:spChg>
       </pc:sldChg>
+      <pc:sldChg chg="modSp new mod">
+        <pc:chgData name="Steffen J.S. Bakker" userId="dd82627c-3b71-46ca-ba5b-5bc6f0c948cc" providerId="ADAL" clId="{38AC7A9E-DF77-41C8-ADA4-08D50E8CBE2E}" dt="2023-12-08T12:23:07.994" v="934" actId="113"/>
+        <pc:sldMkLst>
+          <pc:docMk/>
+          <pc:sldMk cId="2524340786" sldId="262"/>
+        </pc:sldMkLst>
+        <pc:spChg chg="mod">
+          <ac:chgData name="Steffen J.S. Bakker" userId="dd82627c-3b71-46ca-ba5b-5bc6f0c948cc" providerId="ADAL" clId="{38AC7A9E-DF77-41C8-ADA4-08D50E8CBE2E}" dt="2023-12-08T12:23:07.994" v="934" actId="113"/>
+          <ac:spMkLst>
+            <pc:docMk/>
+            <pc:sldMk cId="2524340786" sldId="262"/>
+            <ac:spMk id="3" creationId="{48FAB4EB-C67B-275B-9DF6-62155CF252AE}"/>
+          </ac:spMkLst>
+        </pc:spChg>
+      </pc:sldChg>
     </pc:docChg>
   </pc:docChgLst>
 </pc:chgInfo>
@@ -538,7 +554,7 @@
           <a:p>
             <a:fld id="{F0673D4A-B81A-40C7-BE0B-4EFD34232A5A}" type="datetimeFigureOut">
               <a:rPr lang="nb-NO" smtClean="0"/>
-              <a:t>05.12.2023</a:t>
+              <a:t>08.12.2023</a:t>
             </a:fld>
             <a:endParaRPr lang="nb-NO"/>
           </a:p>
@@ -738,7 +754,7 @@
           <a:p>
             <a:fld id="{F0673D4A-B81A-40C7-BE0B-4EFD34232A5A}" type="datetimeFigureOut">
               <a:rPr lang="nb-NO" smtClean="0"/>
-              <a:t>05.12.2023</a:t>
+              <a:t>08.12.2023</a:t>
             </a:fld>
             <a:endParaRPr lang="nb-NO"/>
           </a:p>
@@ -948,7 +964,7 @@
           <a:p>
             <a:fld id="{F0673D4A-B81A-40C7-BE0B-4EFD34232A5A}" type="datetimeFigureOut">
               <a:rPr lang="nb-NO" smtClean="0"/>
-              <a:t>05.12.2023</a:t>
+              <a:t>08.12.2023</a:t>
             </a:fld>
             <a:endParaRPr lang="nb-NO"/>
           </a:p>
@@ -1148,7 +1164,7 @@
           <a:p>
             <a:fld id="{F0673D4A-B81A-40C7-BE0B-4EFD34232A5A}" type="datetimeFigureOut">
               <a:rPr lang="nb-NO" smtClean="0"/>
-              <a:t>05.12.2023</a:t>
+              <a:t>08.12.2023</a:t>
             </a:fld>
             <a:endParaRPr lang="nb-NO"/>
           </a:p>
@@ -1424,7 +1440,7 @@
           <a:p>
             <a:fld id="{F0673D4A-B81A-40C7-BE0B-4EFD34232A5A}" type="datetimeFigureOut">
               <a:rPr lang="nb-NO" smtClean="0"/>
-              <a:t>05.12.2023</a:t>
+              <a:t>08.12.2023</a:t>
             </a:fld>
             <a:endParaRPr lang="nb-NO"/>
           </a:p>
@@ -1692,7 +1708,7 @@
           <a:p>
             <a:fld id="{F0673D4A-B81A-40C7-BE0B-4EFD34232A5A}" type="datetimeFigureOut">
               <a:rPr lang="nb-NO" smtClean="0"/>
-              <a:t>05.12.2023</a:t>
+              <a:t>08.12.2023</a:t>
             </a:fld>
             <a:endParaRPr lang="nb-NO"/>
           </a:p>
@@ -2107,7 +2123,7 @@
           <a:p>
             <a:fld id="{F0673D4A-B81A-40C7-BE0B-4EFD34232A5A}" type="datetimeFigureOut">
               <a:rPr lang="nb-NO" smtClean="0"/>
-              <a:t>05.12.2023</a:t>
+              <a:t>08.12.2023</a:t>
             </a:fld>
             <a:endParaRPr lang="nb-NO"/>
           </a:p>
@@ -2249,7 +2265,7 @@
           <a:p>
             <a:fld id="{F0673D4A-B81A-40C7-BE0B-4EFD34232A5A}" type="datetimeFigureOut">
               <a:rPr lang="nb-NO" smtClean="0"/>
-              <a:t>05.12.2023</a:t>
+              <a:t>08.12.2023</a:t>
             </a:fld>
             <a:endParaRPr lang="nb-NO"/>
           </a:p>
@@ -2362,7 +2378,7 @@
           <a:p>
             <a:fld id="{F0673D4A-B81A-40C7-BE0B-4EFD34232A5A}" type="datetimeFigureOut">
               <a:rPr lang="nb-NO" smtClean="0"/>
-              <a:t>05.12.2023</a:t>
+              <a:t>08.12.2023</a:t>
             </a:fld>
             <a:endParaRPr lang="nb-NO"/>
           </a:p>
@@ -2675,7 +2691,7 @@
           <a:p>
             <a:fld id="{F0673D4A-B81A-40C7-BE0B-4EFD34232A5A}" type="datetimeFigureOut">
               <a:rPr lang="nb-NO" smtClean="0"/>
-              <a:t>05.12.2023</a:t>
+              <a:t>08.12.2023</a:t>
             </a:fld>
             <a:endParaRPr lang="nb-NO"/>
           </a:p>
@@ -2964,7 +2980,7 @@
           <a:p>
             <a:fld id="{F0673D4A-B81A-40C7-BE0B-4EFD34232A5A}" type="datetimeFigureOut">
               <a:rPr lang="nb-NO" smtClean="0"/>
-              <a:t>05.12.2023</a:t>
+              <a:t>08.12.2023</a:t>
             </a:fld>
             <a:endParaRPr lang="nb-NO"/>
           </a:p>
@@ -3207,7 +3223,7 @@
           <a:p>
             <a:fld id="{F0673D4A-B81A-40C7-BE0B-4EFD34232A5A}" type="datetimeFigureOut">
               <a:rPr lang="nb-NO" smtClean="0"/>
-              <a:t>05.12.2023</a:t>
+              <a:t>08.12.2023</a:t>
             </a:fld>
             <a:endParaRPr lang="nb-NO"/>
           </a:p>
@@ -6874,6 +6890,279 @@
 </p:sld>
 </file>
 
+<file path=ppt/slides/slide7.xml><?xml version="1.0" encoding="utf-8"?>
+<p:sld xmlns:a="http://schemas.openxmlformats.org/drawingml/2006/main" xmlns:r="http://schemas.openxmlformats.org/officeDocument/2006/relationships" xmlns:p="http://schemas.openxmlformats.org/presentationml/2006/main">
+  <p:cSld>
+    <p:spTree>
+      <p:nvGrpSpPr>
+        <p:cNvPr id="1" name=""/>
+        <p:cNvGrpSpPr/>
+        <p:nvPr/>
+      </p:nvGrpSpPr>
+      <p:grpSpPr>
+        <a:xfrm>
+          <a:off x="0" y="0"/>
+          <a:ext cx="0" cy="0"/>
+          <a:chOff x="0" y="0"/>
+          <a:chExt cx="0" cy="0"/>
+        </a:xfrm>
+      </p:grpSpPr>
+      <p:sp>
+        <p:nvSpPr>
+          <p:cNvPr id="2" name="Title 1">
+            <a:extLst>
+              <a:ext uri="{FF2B5EF4-FFF2-40B4-BE49-F238E27FC236}">
+                <a16:creationId xmlns:a16="http://schemas.microsoft.com/office/drawing/2014/main" id="{7B6AD069-19BD-C30B-658A-AA240D887789}"/>
+              </a:ext>
+            </a:extLst>
+          </p:cNvPr>
+          <p:cNvSpPr>
+            <a:spLocks noGrp="1"/>
+          </p:cNvSpPr>
+          <p:nvPr>
+            <p:ph type="title"/>
+          </p:nvPr>
+        </p:nvSpPr>
+        <p:spPr/>
+        <p:txBody>
+          <a:bodyPr/>
+          <a:lstStyle/>
+          <a:p>
+            <a:endParaRPr lang="nb-NO"/>
+          </a:p>
+        </p:txBody>
+      </p:sp>
+      <p:sp>
+        <p:nvSpPr>
+          <p:cNvPr id="3" name="Content Placeholder 2">
+            <a:extLst>
+              <a:ext uri="{FF2B5EF4-FFF2-40B4-BE49-F238E27FC236}">
+                <a16:creationId xmlns:a16="http://schemas.microsoft.com/office/drawing/2014/main" id="{48FAB4EB-C67B-275B-9DF6-62155CF252AE}"/>
+              </a:ext>
+            </a:extLst>
+          </p:cNvPr>
+          <p:cNvSpPr>
+            <a:spLocks noGrp="1"/>
+          </p:cNvSpPr>
+          <p:nvPr>
+            <p:ph idx="1"/>
+          </p:nvPr>
+        </p:nvSpPr>
+        <p:spPr/>
+        <p:txBody>
+          <a:bodyPr/>
+          <a:lstStyle/>
+          <a:p>
+            <a:r>
+              <a:rPr lang="nb-NO" dirty="0"/>
+              <a:t>The </a:t>
+            </a:r>
+            <a:r>
+              <a:rPr lang="nb-NO" dirty="0" err="1"/>
+              <a:t>reason</a:t>
+            </a:r>
+            <a:r>
+              <a:rPr lang="nb-NO" dirty="0"/>
+              <a:t> </a:t>
+            </a:r>
+            <a:r>
+              <a:rPr lang="nb-NO" dirty="0" err="1"/>
+              <a:t>why</a:t>
+            </a:r>
+            <a:r>
+              <a:rPr lang="nb-NO" dirty="0"/>
+              <a:t> TRD-BODØ </a:t>
+            </a:r>
+            <a:r>
+              <a:rPr lang="nb-NO" dirty="0" err="1"/>
+              <a:t>did</a:t>
+            </a:r>
+            <a:r>
+              <a:rPr lang="nb-NO" dirty="0"/>
+              <a:t> not show up in </a:t>
+            </a:r>
+            <a:r>
+              <a:rPr lang="nb-NO" dirty="0" err="1"/>
+              <a:t>the</a:t>
+            </a:r>
+            <a:r>
+              <a:rPr lang="nb-NO" dirty="0"/>
+              <a:t> </a:t>
+            </a:r>
+            <a:r>
+              <a:rPr lang="nb-NO" dirty="0" err="1"/>
+              <a:t>shortest</a:t>
+            </a:r>
+            <a:r>
+              <a:rPr lang="nb-NO" dirty="0"/>
+              <a:t> </a:t>
+            </a:r>
+            <a:r>
+              <a:rPr lang="nb-NO" dirty="0" err="1"/>
+              <a:t>path</a:t>
+            </a:r>
+            <a:r>
+              <a:rPr lang="nb-NO" dirty="0"/>
+              <a:t>, </a:t>
+            </a:r>
+            <a:r>
+              <a:rPr lang="nb-NO" dirty="0" err="1"/>
+              <a:t>was</a:t>
+            </a:r>
+            <a:r>
+              <a:rPr lang="nb-NO" dirty="0"/>
+              <a:t> </a:t>
+            </a:r>
+            <a:r>
+              <a:rPr lang="nb-NO" dirty="0" err="1"/>
+              <a:t>because</a:t>
+            </a:r>
+            <a:r>
+              <a:rPr lang="nb-NO" dirty="0"/>
+              <a:t> </a:t>
+            </a:r>
+            <a:r>
+              <a:rPr lang="nb-NO" dirty="0" err="1"/>
+              <a:t>we</a:t>
+            </a:r>
+            <a:r>
+              <a:rPr lang="nb-NO" dirty="0"/>
+              <a:t> </a:t>
+            </a:r>
+            <a:r>
+              <a:rPr lang="nb-NO" dirty="0" err="1"/>
+              <a:t>counted</a:t>
+            </a:r>
+            <a:r>
+              <a:rPr lang="nb-NO" dirty="0"/>
+              <a:t> half </a:t>
+            </a:r>
+            <a:r>
+              <a:rPr lang="nb-NO" dirty="0" err="1"/>
+              <a:t>the</a:t>
+            </a:r>
+            <a:r>
+              <a:rPr lang="nb-NO" dirty="0"/>
+              <a:t> </a:t>
+            </a:r>
+            <a:r>
+              <a:rPr lang="nb-NO" dirty="0" err="1"/>
+              <a:t>distance</a:t>
+            </a:r>
+            <a:r>
+              <a:rPr lang="nb-NO" dirty="0"/>
+              <a:t> for import/</a:t>
+            </a:r>
+            <a:r>
+              <a:rPr lang="nb-NO" dirty="0" err="1"/>
+              <a:t>export</a:t>
+            </a:r>
+            <a:r>
+              <a:rPr lang="nb-NO" dirty="0"/>
+              <a:t>. This is not </a:t>
+            </a:r>
+            <a:r>
+              <a:rPr lang="nb-NO" dirty="0" err="1"/>
+              <a:t>the</a:t>
+            </a:r>
+            <a:r>
+              <a:rPr lang="nb-NO" dirty="0"/>
+              <a:t> </a:t>
+            </a:r>
+            <a:r>
+              <a:rPr lang="nb-NO" dirty="0" err="1"/>
+              <a:t>correct</a:t>
+            </a:r>
+            <a:r>
+              <a:rPr lang="nb-NO" dirty="0"/>
+              <a:t> </a:t>
+            </a:r>
+            <a:r>
+              <a:rPr lang="nb-NO" dirty="0" err="1"/>
+              <a:t>approach</a:t>
+            </a:r>
+            <a:r>
+              <a:rPr lang="nb-NO" dirty="0"/>
+              <a:t>. </a:t>
+            </a:r>
+            <a:r>
+              <a:rPr lang="nb-NO" dirty="0" err="1"/>
+              <a:t>We</a:t>
+            </a:r>
+            <a:r>
+              <a:rPr lang="nb-NO" dirty="0"/>
+              <a:t> </a:t>
+            </a:r>
+            <a:r>
+              <a:rPr lang="nb-NO" dirty="0" err="1"/>
+              <a:t>should</a:t>
+            </a:r>
+            <a:r>
+              <a:rPr lang="nb-NO" dirty="0"/>
+              <a:t> </a:t>
+            </a:r>
+            <a:r>
+              <a:rPr lang="nb-NO" dirty="0" err="1"/>
+              <a:t>rather</a:t>
+            </a:r>
+            <a:r>
+              <a:rPr lang="nb-NO" dirty="0"/>
+              <a:t> </a:t>
+            </a:r>
+            <a:r>
+              <a:rPr lang="nb-NO" dirty="0" err="1"/>
+              <a:t>reduce</a:t>
+            </a:r>
+            <a:r>
+              <a:rPr lang="nb-NO" dirty="0"/>
+              <a:t> </a:t>
+            </a:r>
+            <a:r>
+              <a:rPr lang="nb-NO" dirty="0" err="1"/>
+              <a:t>the</a:t>
+            </a:r>
+            <a:r>
+              <a:rPr lang="nb-NO" dirty="0"/>
+              <a:t> </a:t>
+            </a:r>
+            <a:r>
+              <a:rPr lang="nb-NO" dirty="0" err="1"/>
+              <a:t>costs</a:t>
+            </a:r>
+            <a:r>
+              <a:rPr lang="nb-NO" dirty="0"/>
+              <a:t>/</a:t>
+            </a:r>
+            <a:r>
+              <a:rPr lang="nb-NO" dirty="0" err="1"/>
+              <a:t>emissions</a:t>
+            </a:r>
+            <a:r>
+              <a:rPr lang="nb-NO" dirty="0"/>
+              <a:t>!</a:t>
+            </a:r>
+          </a:p>
+          <a:p>
+            <a:r>
+              <a:rPr lang="nb-NO" b="1" dirty="0"/>
+              <a:t>TO DO</a:t>
+            </a:r>
+          </a:p>
+        </p:txBody>
+      </p:sp>
+    </p:spTree>
+    <p:extLst>
+      <p:ext uri="{BB962C8B-B14F-4D97-AF65-F5344CB8AC3E}">
+        <p14:creationId xmlns:p14="http://schemas.microsoft.com/office/powerpoint/2010/main" val="2524340786"/>
+      </p:ext>
+    </p:extLst>
+  </p:cSld>
+  <p:clrMapOvr>
+    <a:masterClrMapping/>
+  </p:clrMapOvr>
+</p:sld>
+</file>
+
 <file path=ppt/theme/theme1.xml><?xml version="1.0" encoding="utf-8"?>
 <a:theme xmlns:a="http://schemas.openxmlformats.org/drawingml/2006/main" name="Office Theme">
   <a:themeElements>

</xml_diff>